<commit_message>
Changing initial presentation April 15th milestone and adding the current bi-weekly status
</commit_message>
<xml_diff>
--- a/SheepHerderDocs/Initial_presentation/Initial presentation.pptx
+++ b/SheepHerderDocs/Initial_presentation/Initial presentation.pptx
@@ -129,25 +129,13 @@
 
 <file path=ppt/charts/chart1.xml><?xml version="1.0" encoding="utf-8"?>
 <c:chartSpace xmlns:c="http://schemas.openxmlformats.org/drawingml/2006/chart" xmlns:a="http://schemas.openxmlformats.org/drawingml/2006/main" xmlns:r="http://schemas.openxmlformats.org/officeDocument/2006/relationships">
-  <c:date1904 val="0"/>
   <c:lang val="en-US"/>
-  <c:roundedCorners val="0"/>
-  <mc:AlternateContent xmlns:mc="http://schemas.openxmlformats.org/markup-compatibility/2006">
-    <mc:Choice xmlns:c14="http://schemas.microsoft.com/office/drawing/2007/8/2/chart" Requires="c14">
-      <c14:style val="102"/>
-    </mc:Choice>
-    <mc:Fallback>
-      <c:style val="2"/>
-    </mc:Fallback>
-  </mc:AlternateContent>
   <c:chart>
-    <c:autoTitleDeleted val="0"/>
     <c:plotArea>
       <c:layout/>
       <c:barChart>
         <c:barDir val="bar"/>
         <c:grouping val="clustered"/>
-        <c:varyColors val="0"/>
         <c:ser>
           <c:idx val="0"/>
           <c:order val="0"/>
@@ -167,7 +155,6 @@
               <a:schemeClr val="accent1"/>
             </a:solidFill>
           </c:spPr>
-          <c:invertIfNegative val="0"/>
           <c:cat>
             <c:strRef>
               <c:f>Sheet1!$A$2:$A$5</c:f>
@@ -229,7 +216,6 @@
               <a:schemeClr val="accent2"/>
             </a:solidFill>
           </c:spPr>
-          <c:invertIfNegative val="0"/>
           <c:cat>
             <c:strRef>
               <c:f>Sheet1!$A$2:$A$5</c:f>
@@ -260,7 +246,7 @@
                   <c:v>2.4</c:v>
                 </c:pt>
                 <c:pt idx="1">
-                  <c:v>4.4</c:v>
+                  <c:v>4.4000000000000004</c:v>
                 </c:pt>
                 <c:pt idx="2">
                   <c:v>1.8</c:v>
@@ -291,7 +277,6 @@
               <a:schemeClr val="accent3"/>
             </a:solidFill>
           </c:spPr>
-          <c:invertIfNegative val="0"/>
           <c:cat>
             <c:strRef>
               <c:f>Sheet1!$A$2:$A$5</c:f>
@@ -319,16 +304,16 @@
                 <c:formatCode>General</c:formatCode>
                 <c:ptCount val="4"/>
                 <c:pt idx="0">
-                  <c:v>2.0</c:v>
+                  <c:v>2</c:v>
                 </c:pt>
                 <c:pt idx="1">
-                  <c:v>2.0</c:v>
+                  <c:v>2</c:v>
                 </c:pt>
                 <c:pt idx="2">
-                  <c:v>3.0</c:v>
+                  <c:v>3</c:v>
                 </c:pt>
                 <c:pt idx="3">
-                  <c:v>5.0</c:v>
+                  <c:v>5</c:v>
                 </c:pt>
               </c:numCache>
             </c:numRef>
@@ -353,7 +338,6 @@
               <a:schemeClr val="accent4"/>
             </a:solidFill>
           </c:spPr>
-          <c:invertIfNegative val="0"/>
           <c:cat>
             <c:strRef>
               <c:f>Sheet1!$A$2:$A$5</c:f>
@@ -381,59 +365,47 @@
                 <c:formatCode>General</c:formatCode>
                 <c:ptCount val="4"/>
                 <c:pt idx="0">
-                  <c:v>5.0</c:v>
+                  <c:v>5</c:v>
                 </c:pt>
                 <c:pt idx="1">
-                  <c:v>4.0</c:v>
+                  <c:v>4</c:v>
                 </c:pt>
                 <c:pt idx="2">
-                  <c:v>3.0</c:v>
+                  <c:v>3</c:v>
                 </c:pt>
                 <c:pt idx="3">
-                  <c:v>2.0</c:v>
+                  <c:v>2</c:v>
                 </c:pt>
               </c:numCache>
             </c:numRef>
           </c:val>
         </c:ser>
-        <c:dLbls>
-          <c:showLegendKey val="0"/>
-          <c:showVal val="0"/>
-          <c:showCatName val="0"/>
-          <c:showSerName val="0"/>
-          <c:showPercent val="0"/>
-          <c:showBubbleSize val="0"/>
-        </c:dLbls>
-        <c:gapWidth val="150"/>
-        <c:axId val="2095669368"/>
-        <c:axId val="2095672632"/>
+        <c:dLbls/>
+        <c:axId val="52773248"/>
+        <c:axId val="52774784"/>
       </c:barChart>
       <c:catAx>
-        <c:axId val="2095669368"/>
+        <c:axId val="52773248"/>
         <c:scaling>
           <c:orientation val="minMax"/>
         </c:scaling>
-        <c:delete val="0"/>
         <c:axPos val="l"/>
         <c:majorTickMark val="none"/>
-        <c:minorTickMark val="none"/>
         <c:tickLblPos val="nextTo"/>
         <c:spPr>
           <a:ln w="6350"/>
         </c:spPr>
-        <c:crossAx val="2095672632"/>
+        <c:crossAx val="52774784"/>
         <c:crosses val="autoZero"/>
         <c:auto val="1"/>
         <c:lblAlgn val="ctr"/>
         <c:lblOffset val="100"/>
-        <c:noMultiLvlLbl val="0"/>
       </c:catAx>
       <c:valAx>
-        <c:axId val="2095672632"/>
+        <c:axId val="52774784"/>
         <c:scaling>
           <c:orientation val="minMax"/>
         </c:scaling>
-        <c:delete val="0"/>
         <c:axPos val="b"/>
         <c:majorGridlines>
           <c:spPr>
@@ -446,14 +418,13 @@
         </c:majorGridlines>
         <c:numFmt formatCode="General" sourceLinked="1"/>
         <c:majorTickMark val="in"/>
-        <c:minorTickMark val="none"/>
         <c:tickLblPos val="nextTo"/>
         <c:spPr>
           <a:ln w="6350">
             <a:noFill/>
           </a:ln>
         </c:spPr>
-        <c:crossAx val="2095669368"/>
+        <c:crossAx val="52773248"/>
         <c:crosses val="autoZero"/>
         <c:crossBetween val="between"/>
       </c:valAx>
@@ -466,7 +437,6 @@
     </c:plotArea>
     <c:legend>
       <c:legendPos val="t"/>
-      <c:overlay val="0"/>
       <c:spPr>
         <a:ln>
           <a:noFill/>
@@ -475,7 +445,6 @@
     </c:legend>
     <c:plotVisOnly val="1"/>
     <c:dispBlanksAs val="gap"/>
-    <c:showDLblsOverMax val="0"/>
   </c:chart>
   <c:spPr>
     <a:ln>
@@ -495,29 +464,16 @@
       <a:endParaRPr lang="en-US"/>
     </a:p>
   </c:txPr>
-  <c:externalData r:id="rId1">
-    <c:autoUpdate val="0"/>
-  </c:externalData>
+  <c:externalData r:id="rId1"/>
 </c:chartSpace>
 </file>
 
 <file path=ppt/charts/chart2.xml><?xml version="1.0" encoding="utf-8"?>
 <c:chartSpace xmlns:c="http://schemas.openxmlformats.org/drawingml/2006/chart" xmlns:a="http://schemas.openxmlformats.org/drawingml/2006/main" xmlns:r="http://schemas.openxmlformats.org/officeDocument/2006/relationships">
-  <c:date1904 val="0"/>
   <c:lang val="en-US"/>
-  <c:roundedCorners val="0"/>
-  <mc:AlternateContent xmlns:mc="http://schemas.openxmlformats.org/markup-compatibility/2006">
-    <mc:Choice xmlns:c14="http://schemas.microsoft.com/office/drawing/2007/8/2/chart" Requires="c14">
-      <c14:style val="102"/>
-    </mc:Choice>
-    <mc:Fallback>
-      <c:style val="2"/>
-    </mc:Fallback>
-  </mc:AlternateContent>
   <c:clrMapOvr bg1="lt1" tx1="dk1" bg2="lt2" tx2="dk2" accent1="accent1" accent2="accent2" accent3="accent3" accent4="accent4" accent5="accent5" accent6="accent6" hlink="hlink" folHlink="folHlink"/>
   <c:chart>
     <c:title>
-      <c:overlay val="0"/>
       <c:txPr>
         <a:bodyPr/>
         <a:lstStyle/>
@@ -529,7 +485,6 @@
         </a:p>
       </c:txPr>
     </c:title>
-    <c:autoTitleDeleted val="0"/>
     <c:plotArea>
       <c:layout/>
       <c:pieChart>
@@ -555,7 +510,6 @@
           </c:spPr>
           <c:dPt>
             <c:idx val="0"/>
-            <c:bubble3D val="0"/>
             <c:spPr>
               <a:solidFill>
                 <a:srgbClr val="990033"/>
@@ -564,7 +518,6 @@
           </c:dPt>
           <c:dPt>
             <c:idx val="1"/>
-            <c:bubble3D val="0"/>
             <c:spPr>
               <a:solidFill>
                 <a:srgbClr val="99CC00"/>
@@ -573,7 +526,6 @@
           </c:dPt>
           <c:dPt>
             <c:idx val="2"/>
-            <c:bubble3D val="0"/>
             <c:spPr>
               <a:solidFill>
                 <a:srgbClr val="009999"/>
@@ -582,7 +534,6 @@
           </c:dPt>
           <c:dPt>
             <c:idx val="3"/>
-            <c:bubble3D val="0"/>
             <c:spPr>
               <a:solidFill>
                 <a:srgbClr val="3366CC"/>
@@ -680,7 +631,7 @@
                   <c:v>2.4</c:v>
                 </c:pt>
                 <c:pt idx="1">
-                  <c:v>4.4</c:v>
+                  <c:v>4.4000000000000004</c:v>
                 </c:pt>
                 <c:pt idx="2">
                   <c:v>1.8</c:v>
@@ -738,30 +689,22 @@
                 <c:formatCode>General</c:formatCode>
                 <c:ptCount val="4"/>
                 <c:pt idx="0">
-                  <c:v>2.0</c:v>
+                  <c:v>2</c:v>
                 </c:pt>
                 <c:pt idx="1">
-                  <c:v>2.0</c:v>
+                  <c:v>2</c:v>
                 </c:pt>
                 <c:pt idx="2">
-                  <c:v>3.0</c:v>
+                  <c:v>3</c:v>
                 </c:pt>
                 <c:pt idx="3">
-                  <c:v>5.0</c:v>
+                  <c:v>5</c:v>
                 </c:pt>
               </c:numCache>
             </c:numRef>
           </c:val>
         </c:ser>
-        <c:dLbls>
-          <c:showLegendKey val="0"/>
-          <c:showVal val="0"/>
-          <c:showCatName val="0"/>
-          <c:showSerName val="0"/>
-          <c:showPercent val="0"/>
-          <c:showBubbleSize val="0"/>
-          <c:showLeaderLines val="1"/>
-        </c:dLbls>
+        <c:dLbls/>
         <c:firstSliceAng val="0"/>
       </c:pieChart>
       <c:spPr>
@@ -773,7 +716,6 @@
     </c:plotArea>
     <c:legend>
       <c:legendPos val="t"/>
-      <c:overlay val="0"/>
       <c:spPr>
         <a:ln>
           <a:noFill/>
@@ -782,7 +724,6 @@
     </c:legend>
     <c:plotVisOnly val="1"/>
     <c:dispBlanksAs val="zero"/>
-    <c:showDLblsOverMax val="0"/>
   </c:chart>
   <c:spPr>
     <a:ln>
@@ -802,9 +743,7 @@
       <a:endParaRPr lang="en-US"/>
     </a:p>
   </c:txPr>
-  <c:externalData r:id="rId2">
-    <c:autoUpdate val="0"/>
-  </c:externalData>
+  <c:externalData r:id="rId2"/>
 </c:chartSpace>
 </file>
 
@@ -897,7 +836,7 @@
                 <a:cs typeface="Arial" pitchFamily="34" charset="0"/>
               </a:rPr>
               <a:pPr/>
-              <a:t>2/16/14</a:t>
+              <a:t>29/03/2014</a:t>
             </a:fld>
             <a:endParaRPr lang="en-GB" sz="800" dirty="0">
               <a:latin typeface="Arial" pitchFamily="34" charset="0"/>
@@ -1006,7 +945,7 @@
     </p:spTree>
     <p:extLst>
       <p:ext uri="{BB962C8B-B14F-4D97-AF65-F5344CB8AC3E}">
-        <p14:creationId xmlns:p14="http://schemas.microsoft.com/office/powerpoint/2010/main" val="3319920937"/>
+        <p14:creationId xmlns:p14="http://schemas.microsoft.com/office/powerpoint/2010/main" xmlns="" val="3319920937"/>
       </p:ext>
     </p:extLst>
   </p:cSld>
@@ -1103,7 +1042,7 @@
             <a:fld id="{FA175E2C-59E1-4EF1-A36A-FD7E50E71E80}" type="datetimeFigureOut">
               <a:rPr lang="en-GB" smtClean="0"/>
               <a:pPr/>
-              <a:t>2/16/14</a:t>
+              <a:t>29/03/2014</a:t>
             </a:fld>
             <a:endParaRPr lang="en-GB" dirty="0"/>
           </a:p>
@@ -1282,7 +1221,7 @@
     </p:spTree>
     <p:extLst>
       <p:ext uri="{BB962C8B-B14F-4D97-AF65-F5344CB8AC3E}">
-        <p14:creationId xmlns:p14="http://schemas.microsoft.com/office/powerpoint/2010/main" val="2500505524"/>
+        <p14:creationId xmlns:p14="http://schemas.microsoft.com/office/powerpoint/2010/main" xmlns="" val="2500505524"/>
       </p:ext>
     </p:extLst>
   </p:cSld>
@@ -1469,7 +1408,7 @@
     </p:spTree>
     <p:extLst>
       <p:ext uri="{BB962C8B-B14F-4D97-AF65-F5344CB8AC3E}">
-        <p14:creationId xmlns:p14="http://schemas.microsoft.com/office/powerpoint/2010/main" val="2376658476"/>
+        <p14:creationId xmlns:p14="http://schemas.microsoft.com/office/powerpoint/2010/main" xmlns="" val="2376658476"/>
       </p:ext>
     </p:extLst>
   </p:cSld>
@@ -2982,7 +2921,7 @@
             <a:fld id="{9D21D778-B565-4D7E-94D7-64010A445B68}" type="datetimeFigureOut">
               <a:rPr lang="en-US" smtClean="0"/>
               <a:pPr eaLnBrk="1" latinLnBrk="0" hangingPunct="1"/>
-              <a:t>2/16/14</a:t>
+              <a:t>3/29/2014</a:t>
             </a:fld>
             <a:endParaRPr lang="en-US"/>
           </a:p>
@@ -3186,7 +3125,7 @@
             <a:fld id="{9D21D778-B565-4D7E-94D7-64010A445B68}" type="datetimeFigureOut">
               <a:rPr lang="en-US" smtClean="0"/>
               <a:pPr eaLnBrk="1" latinLnBrk="0" hangingPunct="1"/>
-              <a:t>2/16/14</a:t>
+              <a:t>3/29/2014</a:t>
             </a:fld>
             <a:endParaRPr lang="en-US" dirty="0"/>
           </a:p>
@@ -3467,7 +3406,7 @@
             <a:fld id="{9D21D778-B565-4D7E-94D7-64010A445B68}" type="datetimeFigureOut">
               <a:rPr lang="en-US" smtClean="0"/>
               <a:pPr eaLnBrk="1" latinLnBrk="0" hangingPunct="1"/>
-              <a:t>2/16/14</a:t>
+              <a:t>3/29/2014</a:t>
             </a:fld>
             <a:endParaRPr lang="en-US"/>
           </a:p>
@@ -3658,7 +3597,7 @@
             <a:fld id="{9D21D778-B565-4D7E-94D7-64010A445B68}" type="datetimeFigureOut">
               <a:rPr lang="en-US" smtClean="0"/>
               <a:pPr eaLnBrk="1" latinLnBrk="0" hangingPunct="1"/>
-              <a:t>2/16/14</a:t>
+              <a:t>3/29/2014</a:t>
             </a:fld>
             <a:endParaRPr lang="en-US"/>
           </a:p>
@@ -3887,7 +3826,7 @@
           <a:blip r:embed="rId2" cstate="print">
             <a:extLst>
               <a:ext uri="{28A0092B-C50C-407E-A947-70E740481C1C}">
-                <a14:useLocalDpi xmlns:a14="http://schemas.microsoft.com/office/drawing/2010/main" val="0"/>
+                <a14:useLocalDpi xmlns:a14="http://schemas.microsoft.com/office/drawing/2010/main" xmlns="" val="0"/>
               </a:ext>
             </a:extLst>
           </a:blip>
@@ -3944,7 +3883,7 @@
     </p:spTree>
     <p:extLst>
       <p:ext uri="{BB962C8B-B14F-4D97-AF65-F5344CB8AC3E}">
-        <p14:creationId xmlns:p14="http://schemas.microsoft.com/office/powerpoint/2010/main" val="4172443058"/>
+        <p14:creationId xmlns:p14="http://schemas.microsoft.com/office/powerpoint/2010/main" xmlns="" val="4172443058"/>
       </p:ext>
     </p:extLst>
   </p:cSld>
@@ -3954,7 +3893,7 @@
   <p:timing>
     <p:tnLst>
       <p:par>
-        <p:cTn xmlns:p14="http://schemas.microsoft.com/office/powerpoint/2010/main" id="1" dur="indefinite" restart="never" nodeType="tmRoot"/>
+        <p:cTn id="1" dur="indefinite" restart="never" nodeType="tmRoot"/>
       </p:par>
     </p:tnLst>
   </p:timing>
@@ -4166,7 +4105,7 @@
           <a:blip r:embed="rId2" cstate="print">
             <a:extLst>
               <a:ext uri="{28A0092B-C50C-407E-A947-70E740481C1C}">
-                <a14:useLocalDpi xmlns:a14="http://schemas.microsoft.com/office/drawing/2010/main" val="0"/>
+                <a14:useLocalDpi xmlns:a14="http://schemas.microsoft.com/office/drawing/2010/main" xmlns="" val="0"/>
               </a:ext>
             </a:extLst>
           </a:blip>
@@ -4223,7 +4162,7 @@
     </p:spTree>
     <p:extLst>
       <p:ext uri="{BB962C8B-B14F-4D97-AF65-F5344CB8AC3E}">
-        <p14:creationId xmlns:p14="http://schemas.microsoft.com/office/powerpoint/2010/main" val="893659651"/>
+        <p14:creationId xmlns:p14="http://schemas.microsoft.com/office/powerpoint/2010/main" xmlns="" val="893659651"/>
       </p:ext>
     </p:extLst>
   </p:cSld>
@@ -4233,7 +4172,7 @@
   <p:timing>
     <p:tnLst>
       <p:par>
-        <p:cTn xmlns:p14="http://schemas.microsoft.com/office/powerpoint/2010/main" id="1" dur="indefinite" restart="never" nodeType="tmRoot"/>
+        <p:cTn id="1" dur="indefinite" restart="never" nodeType="tmRoot"/>
       </p:par>
     </p:tnLst>
   </p:timing>
@@ -4441,7 +4380,7 @@
           <a:blip r:embed="rId2" cstate="print">
             <a:extLst>
               <a:ext uri="{28A0092B-C50C-407E-A947-70E740481C1C}">
-                <a14:useLocalDpi xmlns:a14="http://schemas.microsoft.com/office/drawing/2010/main" val="0"/>
+                <a14:useLocalDpi xmlns:a14="http://schemas.microsoft.com/office/drawing/2010/main" xmlns="" val="0"/>
               </a:ext>
             </a:extLst>
           </a:blip>
@@ -4566,7 +4505,7 @@
     </p:spTree>
     <p:extLst>
       <p:ext uri="{BB962C8B-B14F-4D97-AF65-F5344CB8AC3E}">
-        <p14:creationId xmlns:p14="http://schemas.microsoft.com/office/powerpoint/2010/main" val="1397017739"/>
+        <p14:creationId xmlns:p14="http://schemas.microsoft.com/office/powerpoint/2010/main" xmlns="" val="1397017739"/>
       </p:ext>
     </p:extLst>
   </p:cSld>
@@ -4576,7 +4515,7 @@
   <p:timing>
     <p:tnLst>
       <p:par>
-        <p:cTn xmlns:p14="http://schemas.microsoft.com/office/powerpoint/2010/main" id="1" dur="indefinite" restart="never" nodeType="tmRoot"/>
+        <p:cTn id="1" dur="indefinite" restart="never" nodeType="tmRoot"/>
       </p:par>
     </p:tnLst>
   </p:timing>
@@ -4773,7 +4712,7 @@
           <a:blip r:embed="rId2" cstate="print">
             <a:extLst>
               <a:ext uri="{28A0092B-C50C-407E-A947-70E740481C1C}">
-                <a14:useLocalDpi xmlns:a14="http://schemas.microsoft.com/office/drawing/2010/main" val="0"/>
+                <a14:useLocalDpi xmlns:a14="http://schemas.microsoft.com/office/drawing/2010/main" xmlns="" val="0"/>
               </a:ext>
             </a:extLst>
           </a:blip>
@@ -4803,7 +4742,7 @@
           <a:blip r:embed="rId3" cstate="print">
             <a:extLst>
               <a:ext uri="{28A0092B-C50C-407E-A947-70E740481C1C}">
-                <a14:useLocalDpi xmlns:a14="http://schemas.microsoft.com/office/drawing/2010/main" val="0"/>
+                <a14:useLocalDpi xmlns:a14="http://schemas.microsoft.com/office/drawing/2010/main" xmlns="" val="0"/>
               </a:ext>
             </a:extLst>
           </a:blip>
@@ -4863,7 +4802,7 @@
     </p:spTree>
     <p:extLst>
       <p:ext uri="{BB962C8B-B14F-4D97-AF65-F5344CB8AC3E}">
-        <p14:creationId xmlns:p14="http://schemas.microsoft.com/office/powerpoint/2010/main" val="224187675"/>
+        <p14:creationId xmlns:p14="http://schemas.microsoft.com/office/powerpoint/2010/main" xmlns="" val="224187675"/>
       </p:ext>
     </p:extLst>
   </p:cSld>
@@ -4873,7 +4812,7 @@
   <p:timing>
     <p:tnLst>
       <p:par>
-        <p:cTn xmlns:p14="http://schemas.microsoft.com/office/powerpoint/2010/main" id="1" dur="indefinite" restart="never" nodeType="tmRoot"/>
+        <p:cTn id="1" dur="indefinite" restart="never" nodeType="tmRoot"/>
       </p:par>
     </p:tnLst>
   </p:timing>
@@ -5070,7 +5009,7 @@
           <a:blip r:embed="rId2" cstate="print">
             <a:extLst>
               <a:ext uri="{28A0092B-C50C-407E-A947-70E740481C1C}">
-                <a14:useLocalDpi xmlns:a14="http://schemas.microsoft.com/office/drawing/2010/main" val="0"/>
+                <a14:useLocalDpi xmlns:a14="http://schemas.microsoft.com/office/drawing/2010/main" xmlns="" val="0"/>
               </a:ext>
             </a:extLst>
           </a:blip>
@@ -5100,7 +5039,7 @@
           <a:blip r:embed="rId3" cstate="print">
             <a:extLst>
               <a:ext uri="{28A0092B-C50C-407E-A947-70E740481C1C}">
-                <a14:useLocalDpi xmlns:a14="http://schemas.microsoft.com/office/drawing/2010/main" val="0"/>
+                <a14:useLocalDpi xmlns:a14="http://schemas.microsoft.com/office/drawing/2010/main" xmlns="" val="0"/>
               </a:ext>
             </a:extLst>
           </a:blip>
@@ -5160,7 +5099,7 @@
     </p:spTree>
     <p:extLst>
       <p:ext uri="{BB962C8B-B14F-4D97-AF65-F5344CB8AC3E}">
-        <p14:creationId xmlns:p14="http://schemas.microsoft.com/office/powerpoint/2010/main" val="127214035"/>
+        <p14:creationId xmlns:p14="http://schemas.microsoft.com/office/powerpoint/2010/main" xmlns="" val="127214035"/>
       </p:ext>
     </p:extLst>
   </p:cSld>
@@ -5170,7 +5109,7 @@
   <p:timing>
     <p:tnLst>
       <p:par>
-        <p:cTn xmlns:p14="http://schemas.microsoft.com/office/powerpoint/2010/main" id="1" dur="indefinite" restart="never" nodeType="tmRoot"/>
+        <p:cTn id="1" dur="indefinite" restart="never" nodeType="tmRoot"/>
       </p:par>
     </p:tnLst>
   </p:timing>
@@ -5300,7 +5239,7 @@
           <a:blip r:embed="rId2" cstate="print">
             <a:extLst>
               <a:ext uri="{28A0092B-C50C-407E-A947-70E740481C1C}">
-                <a14:useLocalDpi xmlns:a14="http://schemas.microsoft.com/office/drawing/2010/main" val="0"/>
+                <a14:useLocalDpi xmlns:a14="http://schemas.microsoft.com/office/drawing/2010/main" xmlns="" val="0"/>
               </a:ext>
             </a:extLst>
           </a:blip>
@@ -5393,7 +5332,7 @@
     </p:spTree>
     <p:extLst>
       <p:ext uri="{BB962C8B-B14F-4D97-AF65-F5344CB8AC3E}">
-        <p14:creationId xmlns:p14="http://schemas.microsoft.com/office/powerpoint/2010/main" val="3004179911"/>
+        <p14:creationId xmlns:p14="http://schemas.microsoft.com/office/powerpoint/2010/main" xmlns="" val="3004179911"/>
       </p:ext>
     </p:extLst>
   </p:cSld>
@@ -5403,7 +5342,7 @@
   <p:timing>
     <p:tnLst>
       <p:par>
-        <p:cTn xmlns:p14="http://schemas.microsoft.com/office/powerpoint/2010/main" id="1" dur="indefinite" restart="never" nodeType="tmRoot"/>
+        <p:cTn id="1" dur="indefinite" restart="never" nodeType="tmRoot"/>
       </p:par>
     </p:tnLst>
   </p:timing>
@@ -5600,7 +5539,7 @@
           <a:effectLst/>
           <a:extLst>
             <a:ext uri="{AF507438-7753-43e0-B8FC-AC1667EBCBE1}">
-              <a14:hiddenEffects xmlns:a14="http://schemas.microsoft.com/office/drawing/2010/main">
+              <a14:hiddenEffects xmlns:a14="http://schemas.microsoft.com/office/drawing/2010/main" xmlns="">
                 <a:effectLst>
                   <a:outerShdw dist="35921" dir="2700000" algn="ctr" rotWithShape="0">
                     <a:schemeClr val="bg2"/>
@@ -5666,7 +5605,7 @@
           <a:blip r:embed="rId2" cstate="print">
             <a:extLst>
               <a:ext uri="{28A0092B-C50C-407E-A947-70E740481C1C}">
-                <a14:useLocalDpi xmlns:a14="http://schemas.microsoft.com/office/drawing/2010/main" val="0"/>
+                <a14:useLocalDpi xmlns:a14="http://schemas.microsoft.com/office/drawing/2010/main" xmlns="" val="0"/>
               </a:ext>
             </a:extLst>
           </a:blip>
@@ -5723,7 +5662,7 @@
     </p:spTree>
     <p:extLst>
       <p:ext uri="{BB962C8B-B14F-4D97-AF65-F5344CB8AC3E}">
-        <p14:creationId xmlns:p14="http://schemas.microsoft.com/office/powerpoint/2010/main" val="86675937"/>
+        <p14:creationId xmlns:p14="http://schemas.microsoft.com/office/powerpoint/2010/main" xmlns="" val="86675937"/>
       </p:ext>
     </p:extLst>
   </p:cSld>
@@ -5733,7 +5672,7 @@
   <p:timing>
     <p:tnLst>
       <p:par>
-        <p:cTn xmlns:p14="http://schemas.microsoft.com/office/powerpoint/2010/main" id="1" dur="indefinite" restart="never" nodeType="tmRoot"/>
+        <p:cTn id="1" dur="indefinite" restart="never" nodeType="tmRoot"/>
       </p:par>
     </p:tnLst>
   </p:timing>
@@ -5855,7 +5794,7 @@
             <a:fld id="{9D21D778-B565-4D7E-94D7-64010A445B68}" type="datetimeFigureOut">
               <a:rPr lang="en-US" smtClean="0"/>
               <a:pPr eaLnBrk="1" latinLnBrk="0" hangingPunct="1"/>
-              <a:t>2/16/14</a:t>
+              <a:t>3/29/2014</a:t>
             </a:fld>
             <a:endParaRPr lang="en-US"/>
           </a:p>
@@ -6053,7 +5992,7 @@
           <a:blip r:embed="rId2" cstate="print">
             <a:extLst>
               <a:ext uri="{28A0092B-C50C-407E-A947-70E740481C1C}">
-                <a14:useLocalDpi xmlns:a14="http://schemas.microsoft.com/office/drawing/2010/main" val="0"/>
+                <a14:useLocalDpi xmlns:a14="http://schemas.microsoft.com/office/drawing/2010/main" xmlns="" val="0"/>
               </a:ext>
             </a:extLst>
           </a:blip>
@@ -6110,7 +6049,7 @@
     </p:spTree>
     <p:extLst>
       <p:ext uri="{BB962C8B-B14F-4D97-AF65-F5344CB8AC3E}">
-        <p14:creationId xmlns:p14="http://schemas.microsoft.com/office/powerpoint/2010/main" val="8285584"/>
+        <p14:creationId xmlns:p14="http://schemas.microsoft.com/office/powerpoint/2010/main" xmlns="" val="8285584"/>
       </p:ext>
     </p:extLst>
   </p:cSld>
@@ -6120,7 +6059,7 @@
   <p:timing>
     <p:tnLst>
       <p:par>
-        <p:cTn xmlns:p14="http://schemas.microsoft.com/office/powerpoint/2010/main" id="1" dur="indefinite" restart="never" nodeType="tmRoot"/>
+        <p:cTn id="1" dur="indefinite" restart="never" nodeType="tmRoot"/>
       </p:par>
     </p:tnLst>
   </p:timing>
@@ -6235,7 +6174,7 @@
           <a:blip r:embed="rId2" cstate="print">
             <a:extLst>
               <a:ext uri="{28A0092B-C50C-407E-A947-70E740481C1C}">
-                <a14:useLocalDpi xmlns:a14="http://schemas.microsoft.com/office/drawing/2010/main" val="0"/>
+                <a14:useLocalDpi xmlns:a14="http://schemas.microsoft.com/office/drawing/2010/main" xmlns="" val="0"/>
               </a:ext>
             </a:extLst>
           </a:blip>
@@ -6260,7 +6199,7 @@
           <p:nvPr userDrawn="1">
             <p:extLst>
               <p:ext uri="{D42A27DB-BD31-4B8C-83A1-F6EECF244321}">
-                <p14:modId xmlns:p14="http://schemas.microsoft.com/office/powerpoint/2010/main" val="1618250192"/>
+                <p14:modId xmlns:p14="http://schemas.microsoft.com/office/powerpoint/2010/main" xmlns="" val="1618250192"/>
               </p:ext>
             </p:extLst>
           </p:nvPr>
@@ -6314,7 +6253,7 @@
     </p:spTree>
     <p:extLst>
       <p:ext uri="{BB962C8B-B14F-4D97-AF65-F5344CB8AC3E}">
-        <p14:creationId xmlns:p14="http://schemas.microsoft.com/office/powerpoint/2010/main" val="804500376"/>
+        <p14:creationId xmlns:p14="http://schemas.microsoft.com/office/powerpoint/2010/main" xmlns="" val="804500376"/>
       </p:ext>
     </p:extLst>
   </p:cSld>
@@ -6324,7 +6263,7 @@
   <p:timing>
     <p:tnLst>
       <p:par>
-        <p:cTn xmlns:p14="http://schemas.microsoft.com/office/powerpoint/2010/main" id="1" dur="indefinite" restart="never" nodeType="tmRoot"/>
+        <p:cTn id="1" dur="indefinite" restart="never" nodeType="tmRoot"/>
       </p:par>
     </p:tnLst>
   </p:timing>
@@ -6434,7 +6373,7 @@
           <a:blip r:embed="rId2" cstate="print">
             <a:extLst>
               <a:ext uri="{28A0092B-C50C-407E-A947-70E740481C1C}">
-                <a14:useLocalDpi xmlns:a14="http://schemas.microsoft.com/office/drawing/2010/main" val="0"/>
+                <a14:useLocalDpi xmlns:a14="http://schemas.microsoft.com/office/drawing/2010/main" xmlns="" val="0"/>
               </a:ext>
             </a:extLst>
           </a:blip>
@@ -6459,7 +6398,7 @@
           <p:nvPr userDrawn="1">
             <p:extLst>
               <p:ext uri="{D42A27DB-BD31-4B8C-83A1-F6EECF244321}">
-                <p14:modId xmlns:p14="http://schemas.microsoft.com/office/powerpoint/2010/main" val="1658717376"/>
+                <p14:modId xmlns:p14="http://schemas.microsoft.com/office/powerpoint/2010/main" xmlns="" val="1658717376"/>
               </p:ext>
             </p:extLst>
           </p:nvPr>
@@ -6513,7 +6452,7 @@
     </p:spTree>
     <p:extLst>
       <p:ext uri="{BB962C8B-B14F-4D97-AF65-F5344CB8AC3E}">
-        <p14:creationId xmlns:p14="http://schemas.microsoft.com/office/powerpoint/2010/main" val="3472530406"/>
+        <p14:creationId xmlns:p14="http://schemas.microsoft.com/office/powerpoint/2010/main" xmlns="" val="3472530406"/>
       </p:ext>
     </p:extLst>
   </p:cSld>
@@ -6523,7 +6462,7 @@
   <p:timing>
     <p:tnLst>
       <p:par>
-        <p:cTn xmlns:p14="http://schemas.microsoft.com/office/powerpoint/2010/main" id="1" dur="indefinite" restart="never" nodeType="tmRoot"/>
+        <p:cTn id="1" dur="indefinite" restart="never" nodeType="tmRoot"/>
       </p:par>
     </p:tnLst>
   </p:timing>
@@ -6633,7 +6572,7 @@
           <a:blip r:embed="rId2" cstate="print">
             <a:extLst>
               <a:ext uri="{28A0092B-C50C-407E-A947-70E740481C1C}">
-                <a14:useLocalDpi xmlns:a14="http://schemas.microsoft.com/office/drawing/2010/main" val="0"/>
+                <a14:useLocalDpi xmlns:a14="http://schemas.microsoft.com/office/drawing/2010/main" xmlns="" val="0"/>
               </a:ext>
             </a:extLst>
           </a:blip>
@@ -6690,7 +6629,7 @@
     </p:spTree>
     <p:extLst>
       <p:ext uri="{BB962C8B-B14F-4D97-AF65-F5344CB8AC3E}">
-        <p14:creationId xmlns:p14="http://schemas.microsoft.com/office/powerpoint/2010/main" val="2188433489"/>
+        <p14:creationId xmlns:p14="http://schemas.microsoft.com/office/powerpoint/2010/main" xmlns="" val="2188433489"/>
       </p:ext>
     </p:extLst>
   </p:cSld>
@@ -6700,7 +6639,7 @@
   <p:timing>
     <p:tnLst>
       <p:par>
-        <p:cTn xmlns:p14="http://schemas.microsoft.com/office/powerpoint/2010/main" id="1" dur="indefinite" restart="never" nodeType="tmRoot"/>
+        <p:cTn id="1" dur="indefinite" restart="never" nodeType="tmRoot"/>
       </p:par>
     </p:tnLst>
   </p:timing>
@@ -6874,7 +6813,7 @@
           <a:blip r:embed="rId2" cstate="print">
             <a:extLst>
               <a:ext uri="{28A0092B-C50C-407E-A947-70E740481C1C}">
-                <a14:useLocalDpi xmlns:a14="http://schemas.microsoft.com/office/drawing/2010/main" val="0"/>
+                <a14:useLocalDpi xmlns:a14="http://schemas.microsoft.com/office/drawing/2010/main" xmlns="" val="0"/>
               </a:ext>
             </a:extLst>
           </a:blip>
@@ -6931,7 +6870,7 @@
     </p:spTree>
     <p:extLst>
       <p:ext uri="{BB962C8B-B14F-4D97-AF65-F5344CB8AC3E}">
-        <p14:creationId xmlns:p14="http://schemas.microsoft.com/office/powerpoint/2010/main" val="1793845065"/>
+        <p14:creationId xmlns:p14="http://schemas.microsoft.com/office/powerpoint/2010/main" xmlns="" val="1793845065"/>
       </p:ext>
     </p:extLst>
   </p:cSld>
@@ -6941,7 +6880,7 @@
   <p:timing>
     <p:tnLst>
       <p:par>
-        <p:cTn xmlns:p14="http://schemas.microsoft.com/office/powerpoint/2010/main" id="1" dur="indefinite" restart="never" nodeType="tmRoot"/>
+        <p:cTn id="1" dur="indefinite" restart="never" nodeType="tmRoot"/>
       </p:par>
     </p:tnLst>
   </p:timing>
@@ -7120,7 +7059,7 @@
           <a:blip r:embed="rId2" cstate="print">
             <a:extLst>
               <a:ext uri="{28A0092B-C50C-407E-A947-70E740481C1C}">
-                <a14:useLocalDpi xmlns:a14="http://schemas.microsoft.com/office/drawing/2010/main" val="0"/>
+                <a14:useLocalDpi xmlns:a14="http://schemas.microsoft.com/office/drawing/2010/main" xmlns="" val="0"/>
               </a:ext>
             </a:extLst>
           </a:blip>
@@ -7177,7 +7116,7 @@
     </p:spTree>
     <p:extLst>
       <p:ext uri="{BB962C8B-B14F-4D97-AF65-F5344CB8AC3E}">
-        <p14:creationId xmlns:p14="http://schemas.microsoft.com/office/powerpoint/2010/main" val="1669791555"/>
+        <p14:creationId xmlns:p14="http://schemas.microsoft.com/office/powerpoint/2010/main" xmlns="" val="1669791555"/>
       </p:ext>
     </p:extLst>
   </p:cSld>
@@ -7187,7 +7126,7 @@
   <p:timing>
     <p:tnLst>
       <p:par>
-        <p:cTn xmlns:p14="http://schemas.microsoft.com/office/powerpoint/2010/main" id="1" dur="indefinite" restart="never" nodeType="tmRoot"/>
+        <p:cTn id="1" dur="indefinite" restart="never" nodeType="tmRoot"/>
       </p:par>
     </p:tnLst>
   </p:timing>
@@ -7382,7 +7321,7 @@
             <a:fld id="{9D21D778-B565-4D7E-94D7-64010A445B68}" type="datetimeFigureOut">
               <a:rPr lang="en-US" smtClean="0"/>
               <a:pPr algn="r" eaLnBrk="1" latinLnBrk="0" hangingPunct="1"/>
-              <a:t>2/16/14</a:t>
+              <a:t>3/29/2014</a:t>
             </a:fld>
             <a:endParaRPr lang="en-US" sz="1400" dirty="0">
               <a:solidFill>
@@ -7721,7 +7660,7 @@
             <a:fld id="{9D21D778-B565-4D7E-94D7-64010A445B68}" type="datetimeFigureOut">
               <a:rPr lang="en-US" smtClean="0"/>
               <a:pPr eaLnBrk="1" latinLnBrk="0" hangingPunct="1"/>
-              <a:t>2/16/14</a:t>
+              <a:t>3/29/2014</a:t>
             </a:fld>
             <a:endParaRPr lang="en-US"/>
           </a:p>
@@ -7782,7 +7721,7 @@
           <a:blip r:embed="rId2" cstate="print">
             <a:extLst>
               <a:ext uri="{28A0092B-C50C-407E-A947-70E740481C1C}">
-                <a14:useLocalDpi xmlns:a14="http://schemas.microsoft.com/office/drawing/2010/main" val="0"/>
+                <a14:useLocalDpi xmlns:a14="http://schemas.microsoft.com/office/drawing/2010/main" xmlns="" val="0"/>
               </a:ext>
             </a:extLst>
           </a:blip>
@@ -8052,7 +7991,7 @@
             <a:fld id="{9D21D778-B565-4D7E-94D7-64010A445B68}" type="datetimeFigureOut">
               <a:rPr lang="en-US" smtClean="0"/>
               <a:pPr eaLnBrk="1" latinLnBrk="0" hangingPunct="1"/>
-              <a:t>2/16/14</a:t>
+              <a:t>3/29/2014</a:t>
             </a:fld>
             <a:endParaRPr lang="en-US"/>
           </a:p>
@@ -8520,7 +8459,7 @@
             <a:fld id="{9D21D778-B565-4D7E-94D7-64010A445B68}" type="datetimeFigureOut">
               <a:rPr lang="en-US" smtClean="0"/>
               <a:pPr eaLnBrk="1" latinLnBrk="0" hangingPunct="1"/>
-              <a:t>2/16/14</a:t>
+              <a:t>3/29/2014</a:t>
             </a:fld>
             <a:endParaRPr lang="en-US"/>
           </a:p>
@@ -8645,7 +8584,7 @@
             <a:fld id="{9D21D778-B565-4D7E-94D7-64010A445B68}" type="datetimeFigureOut">
               <a:rPr lang="en-US" smtClean="0"/>
               <a:pPr eaLnBrk="1" latinLnBrk="0" hangingPunct="1"/>
-              <a:t>2/16/14</a:t>
+              <a:t>3/29/2014</a:t>
             </a:fld>
             <a:endParaRPr lang="en-US"/>
           </a:p>
@@ -8747,7 +8686,7 @@
             <a:fld id="{9D21D778-B565-4D7E-94D7-64010A445B68}" type="datetimeFigureOut">
               <a:rPr lang="en-US" smtClean="0"/>
               <a:pPr eaLnBrk="1" latinLnBrk="0" hangingPunct="1"/>
-              <a:t>2/16/14</a:t>
+              <a:t>3/29/2014</a:t>
             </a:fld>
             <a:endParaRPr lang="en-US"/>
           </a:p>
@@ -9041,7 +8980,7 @@
             <a:fld id="{9D21D778-B565-4D7E-94D7-64010A445B68}" type="datetimeFigureOut">
               <a:rPr lang="en-US" smtClean="0"/>
               <a:pPr eaLnBrk="1" latinLnBrk="0" hangingPunct="1"/>
-              <a:t>2/16/14</a:t>
+              <a:t>3/29/2014</a:t>
             </a:fld>
             <a:endParaRPr lang="en-US"/>
           </a:p>
@@ -9259,7 +9198,7 @@
             <a:fld id="{9D21D778-B565-4D7E-94D7-64010A445B68}" type="datetimeFigureOut">
               <a:rPr lang="en-US" smtClean="0"/>
               <a:pPr algn="r" eaLnBrk="1" latinLnBrk="0" hangingPunct="1"/>
-              <a:t>2/16/14</a:t>
+              <a:t>3/29/2014</a:t>
             </a:fld>
             <a:endParaRPr lang="en-US" sz="1400" dirty="0">
               <a:solidFill>
@@ -9804,11 +9743,7 @@
           <a:p>
             <a:r>
               <a:rPr lang="en-GB" sz="1600" dirty="0" smtClean="0"/>
-              <a:t>Marcus </a:t>
-            </a:r>
-            <a:r>
-              <a:rPr lang="en-GB" sz="1600" dirty="0" smtClean="0"/>
-              <a:t>Silveira</a:t>
+              <a:t>Marcus Silveira</a:t>
             </a:r>
           </a:p>
           <a:p>
@@ -9864,17 +9799,7 @@
                   </a:schemeClr>
                 </a:solidFill>
               </a:rPr>
-              <a:t>M</a:t>
-            </a:r>
-            <a:r>
-              <a:rPr lang="en-GB" b="1" dirty="0" smtClean="0">
-                <a:solidFill>
-                  <a:schemeClr val="accent3">
-                    <a:lumMod val="50000"/>
-                  </a:schemeClr>
-                </a:solidFill>
-              </a:rPr>
-              <a:t>embers:</a:t>
+              <a:t>Members:</a:t>
             </a:r>
             <a:endParaRPr lang="en-GB" b="1" dirty="0">
               <a:solidFill>
@@ -9926,7 +9851,7 @@
     </p:spTree>
     <p:extLst>
       <p:ext uri="{BB962C8B-B14F-4D97-AF65-F5344CB8AC3E}">
-        <p14:creationId xmlns:p14="http://schemas.microsoft.com/office/powerpoint/2010/main" val="828821643"/>
+        <p14:creationId xmlns:p14="http://schemas.microsoft.com/office/powerpoint/2010/main" xmlns="" val="828821643"/>
       </p:ext>
     </p:extLst>
   </p:cSld>
@@ -9936,7 +9861,7 @@
   <p:timing>
     <p:tnLst>
       <p:par>
-        <p:cTn xmlns:p14="http://schemas.microsoft.com/office/powerpoint/2010/main" id="1" dur="indefinite" restart="never" nodeType="tmRoot"/>
+        <p:cTn id="1" dur="indefinite" restart="never" nodeType="tmRoot"/>
       </p:par>
     </p:tnLst>
   </p:timing>
@@ -10049,7 +9974,7 @@
     </p:spTree>
     <p:extLst>
       <p:ext uri="{BB962C8B-B14F-4D97-AF65-F5344CB8AC3E}">
-        <p14:creationId xmlns:p14="http://schemas.microsoft.com/office/powerpoint/2010/main" val="4290846282"/>
+        <p14:creationId xmlns:p14="http://schemas.microsoft.com/office/powerpoint/2010/main" xmlns="" val="4290846282"/>
       </p:ext>
     </p:extLst>
   </p:cSld>
@@ -10059,7 +9984,7 @@
   <p:timing>
     <p:tnLst>
       <p:par>
-        <p:cTn xmlns:p14="http://schemas.microsoft.com/office/powerpoint/2010/main" id="1" dur="indefinite" restart="never" nodeType="tmRoot"/>
+        <p:cTn id="1" dur="indefinite" restart="never" nodeType="tmRoot"/>
       </p:par>
     </p:tnLst>
   </p:timing>
@@ -10172,7 +10097,7 @@
     </p:spTree>
     <p:extLst>
       <p:ext uri="{BB962C8B-B14F-4D97-AF65-F5344CB8AC3E}">
-        <p14:creationId xmlns:p14="http://schemas.microsoft.com/office/powerpoint/2010/main" val="4290846282"/>
+        <p14:creationId xmlns:p14="http://schemas.microsoft.com/office/powerpoint/2010/main" xmlns="" val="4290846282"/>
       </p:ext>
     </p:extLst>
   </p:cSld>
@@ -10182,7 +10107,7 @@
   <p:timing>
     <p:tnLst>
       <p:par>
-        <p:cTn xmlns:p14="http://schemas.microsoft.com/office/powerpoint/2010/main" id="1" dur="indefinite" restart="never" nodeType="tmRoot"/>
+        <p:cTn id="1" dur="indefinite" restart="never" nodeType="tmRoot"/>
       </p:par>
     </p:tnLst>
   </p:timing>
@@ -10537,7 +10462,7 @@
     </p:spTree>
     <p:extLst>
       <p:ext uri="{BB962C8B-B14F-4D97-AF65-F5344CB8AC3E}">
-        <p14:creationId xmlns:p14="http://schemas.microsoft.com/office/powerpoint/2010/main" val="4290846282"/>
+        <p14:creationId xmlns:p14="http://schemas.microsoft.com/office/powerpoint/2010/main" xmlns="" val="4290846282"/>
       </p:ext>
     </p:extLst>
   </p:cSld>
@@ -10547,7 +10472,7 @@
   <p:timing>
     <p:tnLst>
       <p:par>
-        <p:cTn xmlns:p14="http://schemas.microsoft.com/office/powerpoint/2010/main" id="1" dur="indefinite" restart="never" nodeType="tmRoot"/>
+        <p:cTn id="1" dur="indefinite" restart="never" nodeType="tmRoot"/>
       </p:par>
     </p:tnLst>
   </p:timing>
@@ -10724,44 +10649,13 @@
             </a:pPr>
             <a:r>
               <a:rPr lang="en-GB" sz="1500" dirty="0" smtClean="0"/>
-              <a:t>     Continue work on the game screen (fox and sheep)</a:t>
-            </a:r>
-          </a:p>
-          <a:p>
-            <a:pPr marL="777240" lvl="2" indent="0">
-              <a:buFont typeface="Wingdings" pitchFamily="2" charset="2"/>
-              <a:buChar char="§"/>
-            </a:pPr>
+              <a:t>     Continue work on the game screen (fox and sheep</a:t>
+            </a:r>
             <a:r>
               <a:rPr lang="en-GB" sz="1500" dirty="0" smtClean="0"/>
-              <a:t> </a:t>
-            </a:r>
-            <a:r>
-              <a:rPr lang="en-GB" sz="1400" dirty="0" smtClean="0"/>
-              <a:t>    </a:t>
-            </a:r>
-            <a:r>
-              <a:rPr lang="en-GB" sz="1500" dirty="0" smtClean="0"/>
-              <a:t>Final touches</a:t>
-            </a:r>
-          </a:p>
-          <a:p>
-            <a:pPr marL="777240" lvl="2" indent="0">
-              <a:buFont typeface="Wingdings" pitchFamily="2" charset="2"/>
-              <a:buChar char="§"/>
-            </a:pPr>
-            <a:r>
-              <a:rPr lang="en-GB" sz="1500" dirty="0" smtClean="0"/>
-              <a:t> </a:t>
-            </a:r>
-            <a:r>
-              <a:rPr lang="en-GB" sz="1400" dirty="0" smtClean="0"/>
-              <a:t>    </a:t>
-            </a:r>
-            <a:r>
-              <a:rPr lang="en-GB" sz="1500" dirty="0" smtClean="0"/>
-              <a:t>Submit code to professor</a:t>
-            </a:r>
+              <a:t>)</a:t>
+            </a:r>
+            <a:endParaRPr lang="en-GB" sz="1500" dirty="0" smtClean="0"/>
           </a:p>
           <a:p>
             <a:pPr marL="777240" lvl="2" indent="0">
@@ -10828,8 +10722,45 @@
             </a:r>
             <a:r>
               <a:rPr lang="en-GB" sz="1500" dirty="0" smtClean="0"/>
-              <a:t>Preparing to package / release</a:t>
-            </a:r>
+              <a:t>Preparing to package / </a:t>
+            </a:r>
+            <a:r>
+              <a:rPr lang="en-GB" sz="1500" dirty="0" smtClean="0"/>
+              <a:t>release</a:t>
+            </a:r>
+          </a:p>
+          <a:p>
+            <a:pPr marL="777240" lvl="2" indent="0">
+              <a:buFont typeface="Wingdings" pitchFamily="2" charset="2"/>
+              <a:buChar char="§"/>
+            </a:pPr>
+            <a:r>
+              <a:rPr lang="en-GB" sz="1500" dirty="0" smtClean="0"/>
+              <a:t>     Final </a:t>
+            </a:r>
+            <a:r>
+              <a:rPr lang="en-GB" sz="1500" dirty="0" smtClean="0"/>
+              <a:t>touches</a:t>
+            </a:r>
+          </a:p>
+          <a:p>
+            <a:pPr marL="777240" lvl="2" indent="0">
+              <a:buFont typeface="Wingdings" pitchFamily="2" charset="2"/>
+              <a:buChar char="§"/>
+            </a:pPr>
+            <a:r>
+              <a:rPr lang="en-GB" sz="1500" dirty="0" smtClean="0"/>
+              <a:t> </a:t>
+            </a:r>
+            <a:r>
+              <a:rPr lang="en-GB" sz="1400" dirty="0" smtClean="0"/>
+              <a:t>    </a:t>
+            </a:r>
+            <a:r>
+              <a:rPr lang="en-GB" sz="1500" dirty="0" smtClean="0"/>
+              <a:t>Submit code to professor</a:t>
+            </a:r>
+            <a:endParaRPr lang="en-GB" sz="1500" dirty="0" smtClean="0"/>
           </a:p>
           <a:p>
             <a:pPr marL="777240" lvl="2" indent="0">
@@ -10888,7 +10819,7 @@
     </p:spTree>
     <p:extLst>
       <p:ext uri="{BB962C8B-B14F-4D97-AF65-F5344CB8AC3E}">
-        <p14:creationId xmlns:p14="http://schemas.microsoft.com/office/powerpoint/2010/main" val="4290846282"/>
+        <p14:creationId xmlns:p14="http://schemas.microsoft.com/office/powerpoint/2010/main" xmlns="" val="4290846282"/>
       </p:ext>
     </p:extLst>
   </p:cSld>
@@ -10898,7 +10829,7 @@
   <p:timing>
     <p:tnLst>
       <p:par>
-        <p:cTn xmlns:p14="http://schemas.microsoft.com/office/powerpoint/2010/main" id="1" dur="indefinite" restart="never" nodeType="tmRoot"/>
+        <p:cTn id="1" dur="indefinite" restart="never" nodeType="tmRoot"/>
       </p:par>
     </p:tnLst>
   </p:timing>
@@ -11018,7 +10949,7 @@
     </p:spTree>
     <p:extLst>
       <p:ext uri="{BB962C8B-B14F-4D97-AF65-F5344CB8AC3E}">
-        <p14:creationId xmlns:p14="http://schemas.microsoft.com/office/powerpoint/2010/main" val="538637548"/>
+        <p14:creationId xmlns:p14="http://schemas.microsoft.com/office/powerpoint/2010/main" xmlns="" val="538637548"/>
       </p:ext>
     </p:extLst>
   </p:cSld>
@@ -11028,7 +10959,7 @@
   <p:timing>
     <p:tnLst>
       <p:par>
-        <p:cTn xmlns:p14="http://schemas.microsoft.com/office/powerpoint/2010/main" id="1" dur="indefinite" restart="never" nodeType="tmRoot"/>
+        <p:cTn id="1" dur="indefinite" restart="never" nodeType="tmRoot"/>
       </p:par>
     </p:tnLst>
   </p:timing>
@@ -11178,7 +11109,7 @@
     </p:spTree>
     <p:extLst>
       <p:ext uri="{BB962C8B-B14F-4D97-AF65-F5344CB8AC3E}">
-        <p14:creationId xmlns:p14="http://schemas.microsoft.com/office/powerpoint/2010/main" val="1010402895"/>
+        <p14:creationId xmlns:p14="http://schemas.microsoft.com/office/powerpoint/2010/main" xmlns="" val="1010402895"/>
       </p:ext>
     </p:extLst>
   </p:cSld>
@@ -11188,7 +11119,7 @@
   <p:timing>
     <p:tnLst>
       <p:par>
-        <p:cTn xmlns:p14="http://schemas.microsoft.com/office/powerpoint/2010/main" id="1" dur="indefinite" restart="never" nodeType="tmRoot"/>
+        <p:cTn id="1" dur="indefinite" restart="never" nodeType="tmRoot"/>
       </p:par>
     </p:tnLst>
   </p:timing>
@@ -11352,7 +11283,7 @@
     </p:spTree>
     <p:extLst>
       <p:ext uri="{BB962C8B-B14F-4D97-AF65-F5344CB8AC3E}">
-        <p14:creationId xmlns:p14="http://schemas.microsoft.com/office/powerpoint/2010/main" val="4290846282"/>
+        <p14:creationId xmlns:p14="http://schemas.microsoft.com/office/powerpoint/2010/main" xmlns="" val="4290846282"/>
       </p:ext>
     </p:extLst>
   </p:cSld>
@@ -11362,7 +11293,7 @@
   <p:timing>
     <p:tnLst>
       <p:par>
-        <p:cTn xmlns:p14="http://schemas.microsoft.com/office/powerpoint/2010/main" id="1" dur="indefinite" restart="never" nodeType="tmRoot"/>
+        <p:cTn id="1" dur="indefinite" restart="never" nodeType="tmRoot"/>
       </p:par>
     </p:tnLst>
   </p:timing>
@@ -11493,11 +11424,6 @@
               </a:rPr>
               <a:t>Sheep</a:t>
             </a:r>
-            <a:endParaRPr lang="en-GB" sz="1600" b="1" dirty="0" smtClean="0">
-              <a:solidFill>
-                <a:srgbClr val="713B0E"/>
-              </a:solidFill>
-            </a:endParaRPr>
           </a:p>
           <a:p>
             <a:pPr marL="777240" lvl="2" indent="0">
@@ -11631,7 +11557,7 @@
     </p:spTree>
     <p:extLst>
       <p:ext uri="{BB962C8B-B14F-4D97-AF65-F5344CB8AC3E}">
-        <p14:creationId xmlns:p14="http://schemas.microsoft.com/office/powerpoint/2010/main" val="4290846282"/>
+        <p14:creationId xmlns:p14="http://schemas.microsoft.com/office/powerpoint/2010/main" xmlns="" val="4290846282"/>
       </p:ext>
     </p:extLst>
   </p:cSld>
@@ -11641,7 +11567,7 @@
   <p:timing>
     <p:tnLst>
       <p:par>
-        <p:cTn xmlns:p14="http://schemas.microsoft.com/office/powerpoint/2010/main" id="1" dur="indefinite" restart="never" nodeType="tmRoot"/>
+        <p:cTn id="1" dur="indefinite" restart="never" nodeType="tmRoot"/>
       </p:par>
     </p:tnLst>
   </p:timing>
@@ -11772,23 +11698,35 @@
                   <a:schemeClr val="tx1"/>
                 </a:solidFill>
               </a:rPr>
-              <a:t>Representation </a:t>
-            </a:r>
+              <a:t>Representation of each animal and its characteristics</a:t>
+            </a:r>
+          </a:p>
+          <a:p>
+            <a:pPr marL="697230" lvl="1" indent="-285750">
+              <a:buFont typeface="Wingdings" charset="2"/>
+              <a:buChar char="§"/>
+            </a:pPr>
             <a:r>
               <a:rPr lang="en-GB" sz="1600" dirty="0" smtClean="0">
                 <a:solidFill>
                   <a:schemeClr val="tx1"/>
                 </a:solidFill>
               </a:rPr>
-              <a:t>of each animal and its </a:t>
-            </a:r>
+              <a:t>Full screen game with independent rendering (for each set of animals)</a:t>
+            </a:r>
+          </a:p>
+          <a:p>
+            <a:pPr marL="697230" lvl="1" indent="-285750">
+              <a:buFont typeface="Wingdings" charset="2"/>
+              <a:buChar char="§"/>
+            </a:pPr>
             <a:r>
               <a:rPr lang="en-GB" sz="1600" dirty="0" smtClean="0">
                 <a:solidFill>
                   <a:schemeClr val="tx1"/>
                 </a:solidFill>
               </a:rPr>
-              <a:t>characteristics</a:t>
+              <a:t>User has full control over the dog</a:t>
             </a:r>
           </a:p>
           <a:p>
@@ -11802,156 +11740,43 @@
                   <a:schemeClr val="tx1"/>
                 </a:solidFill>
               </a:rPr>
-              <a:t>Full </a:t>
-            </a:r>
+              <a:t>Artificial Intelligence for Fox and Sheep to move and react</a:t>
+            </a:r>
+          </a:p>
+          <a:p>
+            <a:pPr marL="697230" lvl="1" indent="-285750">
+              <a:buFont typeface="Wingdings" charset="2"/>
+              <a:buChar char="§"/>
+            </a:pPr>
             <a:r>
               <a:rPr lang="en-GB" sz="1600" dirty="0" smtClean="0">
                 <a:solidFill>
                   <a:schemeClr val="tx1"/>
                 </a:solidFill>
               </a:rPr>
-              <a:t>screen game with independent rendering (for each set of animals</a:t>
-            </a:r>
+              <a:t>Three main screens: home screen, settings, and game screen</a:t>
+            </a:r>
+          </a:p>
+          <a:p>
+            <a:pPr marL="697230" lvl="1" indent="-285750">
+              <a:buFont typeface="Wingdings" charset="2"/>
+              <a:buChar char="§"/>
+            </a:pPr>
             <a:r>
               <a:rPr lang="en-GB" sz="1600" dirty="0" smtClean="0">
                 <a:solidFill>
                   <a:schemeClr val="tx1"/>
                 </a:solidFill>
               </a:rPr>
-              <a:t>)</a:t>
-            </a:r>
-          </a:p>
-          <a:p>
-            <a:pPr marL="697230" lvl="1" indent="-285750">
-              <a:buFont typeface="Wingdings" charset="2"/>
-              <a:buChar char="§"/>
-            </a:pPr>
-            <a:r>
-              <a:rPr lang="en-GB" sz="1600" dirty="0" smtClean="0">
-                <a:solidFill>
-                  <a:schemeClr val="tx1"/>
-                </a:solidFill>
-              </a:rPr>
-              <a:t>User </a:t>
-            </a:r>
-            <a:r>
-              <a:rPr lang="en-GB" sz="1600" dirty="0" smtClean="0">
-                <a:solidFill>
-                  <a:schemeClr val="tx1"/>
-                </a:solidFill>
-              </a:rPr>
-              <a:t>has full control over the </a:t>
-            </a:r>
-            <a:r>
-              <a:rPr lang="en-GB" sz="1600" dirty="0" smtClean="0">
-                <a:solidFill>
-                  <a:schemeClr val="tx1"/>
-                </a:solidFill>
-              </a:rPr>
-              <a:t>dog</a:t>
-            </a:r>
-          </a:p>
-          <a:p>
-            <a:pPr marL="697230" lvl="1" indent="-285750">
-              <a:buFont typeface="Wingdings" charset="2"/>
-              <a:buChar char="§"/>
-            </a:pPr>
-            <a:r>
-              <a:rPr lang="en-GB" sz="1600" dirty="0" smtClean="0">
-                <a:solidFill>
-                  <a:schemeClr val="tx1"/>
-                </a:solidFill>
-              </a:rPr>
-              <a:t>Artificial </a:t>
-            </a:r>
-            <a:r>
-              <a:rPr lang="en-GB" sz="1600" dirty="0" smtClean="0">
-                <a:solidFill>
-                  <a:schemeClr val="tx1"/>
-                </a:solidFill>
-              </a:rPr>
-              <a:t>Intelligence for Fox and Sheep to move and </a:t>
-            </a:r>
-            <a:r>
-              <a:rPr lang="en-GB" sz="1600" dirty="0" smtClean="0">
-                <a:solidFill>
-                  <a:schemeClr val="tx1"/>
-                </a:solidFill>
-              </a:rPr>
-              <a:t>react</a:t>
-            </a:r>
-          </a:p>
-          <a:p>
-            <a:pPr marL="697230" lvl="1" indent="-285750">
-              <a:buFont typeface="Wingdings" charset="2"/>
-              <a:buChar char="§"/>
-            </a:pPr>
-            <a:r>
-              <a:rPr lang="en-GB" sz="1600" dirty="0" smtClean="0">
-                <a:solidFill>
-                  <a:schemeClr val="tx1"/>
-                </a:solidFill>
-              </a:rPr>
-              <a:t>Three </a:t>
-            </a:r>
-            <a:r>
-              <a:rPr lang="en-GB" sz="1600" dirty="0" smtClean="0">
-                <a:solidFill>
-                  <a:schemeClr val="tx1"/>
-                </a:solidFill>
-              </a:rPr>
-              <a:t>main screens: home screen, settings, and game </a:t>
-            </a:r>
-            <a:r>
-              <a:rPr lang="en-GB" sz="1600" dirty="0" smtClean="0">
-                <a:solidFill>
-                  <a:schemeClr val="tx1"/>
-                </a:solidFill>
-              </a:rPr>
-              <a:t>screen</a:t>
-            </a:r>
-          </a:p>
-          <a:p>
-            <a:pPr marL="697230" lvl="1" indent="-285750">
-              <a:buFont typeface="Wingdings" charset="2"/>
-              <a:buChar char="§"/>
-            </a:pPr>
-            <a:r>
-              <a:rPr lang="en-GB" sz="1600" dirty="0" smtClean="0">
-                <a:solidFill>
-                  <a:schemeClr val="tx1"/>
-                </a:solidFill>
-              </a:rPr>
-              <a:t>Ability </a:t>
-            </a:r>
-            <a:r>
-              <a:rPr lang="en-GB" sz="1600" dirty="0" smtClean="0">
-                <a:solidFill>
-                  <a:schemeClr val="tx1"/>
-                </a:solidFill>
-              </a:rPr>
-              <a:t>to control speed of animals (by default:  fox’s speed &gt; dog’s &gt; sheep’s</a:t>
-            </a:r>
-            <a:r>
-              <a:rPr lang="en-GB" sz="1600" dirty="0" smtClean="0">
-                <a:solidFill>
-                  <a:schemeClr val="tx1"/>
-                </a:solidFill>
-              </a:rPr>
-              <a:t>)</a:t>
-            </a:r>
-            <a:endParaRPr lang="en-GB" sz="1600" dirty="0" smtClean="0">
-              <a:solidFill>
-                <a:schemeClr val="tx1"/>
-              </a:solidFill>
-            </a:endParaRPr>
+              <a:t>Ability to control speed of animals (by default:  fox’s speed &gt; dog’s &gt; sheep’s)</a:t>
+            </a:r>
           </a:p>
         </p:txBody>
       </p:sp>
     </p:spTree>
     <p:extLst>
       <p:ext uri="{BB962C8B-B14F-4D97-AF65-F5344CB8AC3E}">
-        <p14:creationId xmlns:p14="http://schemas.microsoft.com/office/powerpoint/2010/main" val="4290846282"/>
+        <p14:creationId xmlns:p14="http://schemas.microsoft.com/office/powerpoint/2010/main" xmlns="" val="4290846282"/>
       </p:ext>
     </p:extLst>
   </p:cSld>
@@ -11961,7 +11786,7 @@
   <p:timing>
     <p:tnLst>
       <p:par>
-        <p:cTn xmlns:p14="http://schemas.microsoft.com/office/powerpoint/2010/main" id="1" dur="indefinite" restart="never" nodeType="tmRoot"/>
+        <p:cTn id="1" dur="indefinite" restart="never" nodeType="tmRoot"/>
       </p:par>
     </p:tnLst>
   </p:timing>
@@ -12097,15 +11922,7 @@
                   <a:srgbClr val="000000"/>
                 </a:solidFill>
               </a:rPr>
-              <a:t>Android </a:t>
-            </a:r>
-            <a:r>
-              <a:rPr lang="en-GB" sz="1600" dirty="0" smtClean="0">
-                <a:solidFill>
-                  <a:srgbClr val="000000"/>
-                </a:solidFill>
-              </a:rPr>
-              <a:t>application that doesn’t need to contact any external service</a:t>
+              <a:t>Android application that doesn’t need to contact any external service</a:t>
             </a:r>
           </a:p>
           <a:p>
@@ -12277,7 +12094,7 @@
     </p:spTree>
     <p:extLst>
       <p:ext uri="{BB962C8B-B14F-4D97-AF65-F5344CB8AC3E}">
-        <p14:creationId xmlns:p14="http://schemas.microsoft.com/office/powerpoint/2010/main" val="3725726106"/>
+        <p14:creationId xmlns:p14="http://schemas.microsoft.com/office/powerpoint/2010/main" xmlns="" val="3725726106"/>
       </p:ext>
     </p:extLst>
   </p:cSld>
@@ -12287,7 +12104,7 @@
   <p:timing>
     <p:tnLst>
       <p:par>
-        <p:cTn xmlns:p14="http://schemas.microsoft.com/office/powerpoint/2010/main" id="1" dur="indefinite" restart="never" nodeType="tmRoot"/>
+        <p:cTn id="1" dur="indefinite" restart="never" nodeType="tmRoot"/>
       </p:par>
     </p:tnLst>
   </p:timing>
@@ -12448,7 +12265,7 @@
     </p:spTree>
     <p:extLst>
       <p:ext uri="{BB962C8B-B14F-4D97-AF65-F5344CB8AC3E}">
-        <p14:creationId xmlns:p14="http://schemas.microsoft.com/office/powerpoint/2010/main" val="4290846282"/>
+        <p14:creationId xmlns:p14="http://schemas.microsoft.com/office/powerpoint/2010/main" xmlns="" val="4290846282"/>
       </p:ext>
     </p:extLst>
   </p:cSld>
@@ -12458,7 +12275,7 @@
   <p:timing>
     <p:tnLst>
       <p:par>
-        <p:cTn xmlns:p14="http://schemas.microsoft.com/office/powerpoint/2010/main" id="1" dur="indefinite" restart="never" nodeType="tmRoot"/>
+        <p:cTn id="1" dur="indefinite" restart="never" nodeType="tmRoot"/>
       </p:par>
     </p:tnLst>
   </p:timing>
@@ -12563,7 +12380,7 @@
     </p:spTree>
     <p:extLst>
       <p:ext uri="{BB962C8B-B14F-4D97-AF65-F5344CB8AC3E}">
-        <p14:creationId xmlns:p14="http://schemas.microsoft.com/office/powerpoint/2010/main" val="4290846282"/>
+        <p14:creationId xmlns:p14="http://schemas.microsoft.com/office/powerpoint/2010/main" xmlns="" val="4290846282"/>
       </p:ext>
     </p:extLst>
   </p:cSld>
@@ -12573,7 +12390,7 @@
   <p:timing>
     <p:tnLst>
       <p:par>
-        <p:cTn xmlns:p14="http://schemas.microsoft.com/office/powerpoint/2010/main" id="1" dur="indefinite" restart="never" nodeType="tmRoot"/>
+        <p:cTn id="1" dur="indefinite" restart="never" nodeType="tmRoot"/>
       </p:par>
     </p:tnLst>
   </p:timing>
@@ -12686,7 +12503,7 @@
     </p:spTree>
     <p:extLst>
       <p:ext uri="{BB962C8B-B14F-4D97-AF65-F5344CB8AC3E}">
-        <p14:creationId xmlns:p14="http://schemas.microsoft.com/office/powerpoint/2010/main" val="4290846282"/>
+        <p14:creationId xmlns:p14="http://schemas.microsoft.com/office/powerpoint/2010/main" xmlns="" val="4290846282"/>
       </p:ext>
     </p:extLst>
   </p:cSld>
@@ -12696,7 +12513,7 @@
   <p:timing>
     <p:tnLst>
       <p:par>
-        <p:cTn xmlns:p14="http://schemas.microsoft.com/office/powerpoint/2010/main" id="1" dur="indefinite" restart="never" nodeType="tmRoot"/>
+        <p:cTn id="1" dur="indefinite" restart="never" nodeType="tmRoot"/>
       </p:par>
     </p:tnLst>
   </p:timing>
@@ -12809,7 +12626,7 @@
     </p:spTree>
     <p:extLst>
       <p:ext uri="{BB962C8B-B14F-4D97-AF65-F5344CB8AC3E}">
-        <p14:creationId xmlns:p14="http://schemas.microsoft.com/office/powerpoint/2010/main" val="4290846282"/>
+        <p14:creationId xmlns:p14="http://schemas.microsoft.com/office/powerpoint/2010/main" xmlns="" val="4290846282"/>
       </p:ext>
     </p:extLst>
   </p:cSld>
@@ -12819,7 +12636,7 @@
   <p:timing>
     <p:tnLst>
       <p:par>
-        <p:cTn xmlns:p14="http://schemas.microsoft.com/office/powerpoint/2010/main" id="1" dur="indefinite" restart="never" nodeType="tmRoot"/>
+        <p:cTn id="1" dur="indefinite" restart="never" nodeType="tmRoot"/>
       </p:par>
     </p:tnLst>
   </p:timing>

</xml_diff>